<commit_message>
focuses conclusion on features rather than dTree Smaller changes: 1. fixes typo in abstract 1. Adds random forest to list of models to test
</commit_message>
<xml_diff>
--- a/Poster/FinalProjectPoster.pptx
+++ b/Poster/FinalProjectPoster.pptx
@@ -106,7 +106,7 @@
   </p:defaultTextStyle>
   <p:extLst>
     <p:ext uri="{EFAFB233-063F-42B5-8137-9DF3F51BA10A}">
-      <p15:sldGuideLst xmlns:p15="http://schemas.microsoft.com/office/powerpoint/2012/main">
+      <p15:sldGuideLst xmlns:p15="http://schemas.microsoft.com/office/powerpoint/2012/main" xmlns="">
         <p15:guide id="1" orient="horz" pos="6912" userDrawn="1">
           <p15:clr>
             <a:srgbClr val="A4A3A4"/>
@@ -254,7 +254,7 @@
           <a:p>
             <a:fld id="{8B029327-141B-4754-9AA5-14FF79521D66}" type="datetimeFigureOut">
               <a:rPr lang="en-US" smtClean="0"/>
-              <a:t>3/14/2016</a:t>
+              <a:t>3/15/16</a:t>
             </a:fld>
             <a:endParaRPr lang="en-US"/>
           </a:p>
@@ -424,7 +424,7 @@
           <a:p>
             <a:fld id="{8B029327-141B-4754-9AA5-14FF79521D66}" type="datetimeFigureOut">
               <a:rPr lang="en-US" smtClean="0"/>
-              <a:t>3/14/2016</a:t>
+              <a:t>3/15/16</a:t>
             </a:fld>
             <a:endParaRPr lang="en-US"/>
           </a:p>
@@ -604,7 +604,7 @@
           <a:p>
             <a:fld id="{8B029327-141B-4754-9AA5-14FF79521D66}" type="datetimeFigureOut">
               <a:rPr lang="en-US" smtClean="0"/>
-              <a:t>3/14/2016</a:t>
+              <a:t>3/15/16</a:t>
             </a:fld>
             <a:endParaRPr lang="en-US"/>
           </a:p>
@@ -774,7 +774,7 @@
           <a:p>
             <a:fld id="{8B029327-141B-4754-9AA5-14FF79521D66}" type="datetimeFigureOut">
               <a:rPr lang="en-US" smtClean="0"/>
-              <a:t>3/14/2016</a:t>
+              <a:t>3/15/16</a:t>
             </a:fld>
             <a:endParaRPr lang="en-US"/>
           </a:p>
@@ -1018,7 +1018,7 @@
           <a:p>
             <a:fld id="{8B029327-141B-4754-9AA5-14FF79521D66}" type="datetimeFigureOut">
               <a:rPr lang="en-US" smtClean="0"/>
-              <a:t>3/14/2016</a:t>
+              <a:t>3/15/16</a:t>
             </a:fld>
             <a:endParaRPr lang="en-US"/>
           </a:p>
@@ -1250,7 +1250,7 @@
           <a:p>
             <a:fld id="{8B029327-141B-4754-9AA5-14FF79521D66}" type="datetimeFigureOut">
               <a:rPr lang="en-US" smtClean="0"/>
-              <a:t>3/14/2016</a:t>
+              <a:t>3/15/16</a:t>
             </a:fld>
             <a:endParaRPr lang="en-US"/>
           </a:p>
@@ -1617,7 +1617,7 @@
           <a:p>
             <a:fld id="{8B029327-141B-4754-9AA5-14FF79521D66}" type="datetimeFigureOut">
               <a:rPr lang="en-US" smtClean="0"/>
-              <a:t>3/14/2016</a:t>
+              <a:t>3/15/16</a:t>
             </a:fld>
             <a:endParaRPr lang="en-US"/>
           </a:p>
@@ -1735,7 +1735,7 @@
           <a:p>
             <a:fld id="{8B029327-141B-4754-9AA5-14FF79521D66}" type="datetimeFigureOut">
               <a:rPr lang="en-US" smtClean="0"/>
-              <a:t>3/14/2016</a:t>
+              <a:t>3/15/16</a:t>
             </a:fld>
             <a:endParaRPr lang="en-US"/>
           </a:p>
@@ -1830,7 +1830,7 @@
           <a:p>
             <a:fld id="{8B029327-141B-4754-9AA5-14FF79521D66}" type="datetimeFigureOut">
               <a:rPr lang="en-US" smtClean="0"/>
-              <a:t>3/14/2016</a:t>
+              <a:t>3/15/16</a:t>
             </a:fld>
             <a:endParaRPr lang="en-US"/>
           </a:p>
@@ -2107,7 +2107,7 @@
           <a:p>
             <a:fld id="{8B029327-141B-4754-9AA5-14FF79521D66}" type="datetimeFigureOut">
               <a:rPr lang="en-US" smtClean="0"/>
-              <a:t>3/14/2016</a:t>
+              <a:t>3/15/16</a:t>
             </a:fld>
             <a:endParaRPr lang="en-US"/>
           </a:p>
@@ -2364,7 +2364,7 @@
           <a:p>
             <a:fld id="{8B029327-141B-4754-9AA5-14FF79521D66}" type="datetimeFigureOut">
               <a:rPr lang="en-US" smtClean="0"/>
-              <a:t>3/14/2016</a:t>
+              <a:t>3/15/16</a:t>
             </a:fld>
             <a:endParaRPr lang="en-US"/>
           </a:p>
@@ -2577,7 +2577,7 @@
           <a:p>
             <a:fld id="{8B029327-141B-4754-9AA5-14FF79521D66}" type="datetimeFigureOut">
               <a:rPr lang="en-US" smtClean="0"/>
-              <a:t>3/14/2016</a:t>
+              <a:t>3/15/16</a:t>
             </a:fld>
             <a:endParaRPr lang="en-US"/>
           </a:p>
@@ -3055,7 +3055,7 @@
         <p:spPr>
           <a:xfrm>
             <a:off x="3359524" y="6469925"/>
-            <a:ext cx="8256494" cy="7323890"/>
+            <a:ext cx="8256494" cy="7842954"/>
           </a:xfrm>
         </p:spPr>
         <p:txBody>
@@ -3075,11 +3075,19 @@
             </a:r>
             <a:r>
               <a:rPr lang="en-US" sz="4000" dirty="0"/>
-              <a:t>built a machine learning system to identify whether a recording of a sound has a human scream in it. This task is important as it may potentially allow for computerized surveillance systems to replace human-centric ones. Since this in the context of a surveillance system, so we trained and tested our system on sounds that would occur in a variety of surveillance situations, such as construction/manmade sounds, bird </a:t>
+              <a:t>built a machine learning system to identify whether a recording of a sound has a human scream in it. This task is important as it may potentially allow for computerized surveillance systems to replace human-centric ones. Since this in the context of a surveillance system, </a:t>
             </a:r>
             <a:r>
               <a:rPr lang="en-US" sz="4000" dirty="0" smtClean="0"/>
-              <a:t>calls.</a:t>
+              <a:t>we </a:t>
+            </a:r>
+            <a:r>
+              <a:rPr lang="en-US" sz="4000" dirty="0"/>
+              <a:t>trained and tested our system on sounds that would occur in a variety of surveillance situations, such as construction/manmade sounds</a:t>
+            </a:r>
+            <a:r>
+              <a:rPr lang="en-US" sz="4000" dirty="0" smtClean="0"/>
+              <a:t>, singing and sounds of nature (i.e. bird and other animal calls).</a:t>
             </a:r>
             <a:endParaRPr lang="en-US" sz="4000" dirty="0"/>
           </a:p>
@@ -3939,7 +3947,23 @@
             <a:pPr algn="l"/>
             <a:r>
               <a:rPr lang="en-US" sz="4000" dirty="0" smtClean="0"/>
-              <a:t>    Given more time and resources, we would consider exploring more parameters on the decision tree, including testing on max depths of more than 10, trying different minimum populations of leaves, and further cross validation.</a:t>
+              <a:t>    Given more time and resources, we would consider exploring </a:t>
+            </a:r>
+            <a:r>
+              <a:rPr lang="en-US" sz="4000" dirty="0" smtClean="0"/>
+              <a:t>more features such as </a:t>
+            </a:r>
+            <a:r>
+              <a:rPr lang="en-US" sz="4000" dirty="0" smtClean="0"/>
+              <a:t>relations between time segments (e.g. a scream should have no beat) </a:t>
+            </a:r>
+            <a:r>
+              <a:rPr lang="en-US" sz="4000" dirty="0" smtClean="0"/>
+              <a:t>and </a:t>
+            </a:r>
+            <a:r>
+              <a:rPr lang="en-US" sz="4000" dirty="0" smtClean="0"/>
+              <a:t>further cross validation.</a:t>
             </a:r>
           </a:p>
           <a:p>
@@ -3950,7 +3974,15 @@
             </a:r>
             <a:r>
               <a:rPr lang="en-US" sz="4000" dirty="0" smtClean="0"/>
-              <a:t>   This also includes testing on different machine learning models, such as nearest neighbors, neural nets, etc. </a:t>
+              <a:t>   This also includes testing on different machine learning models, such as nearest neighbors, neural nets, </a:t>
+            </a:r>
+            <a:r>
+              <a:rPr lang="en-US" sz="4000" dirty="0" smtClean="0"/>
+              <a:t>random forests, etc</a:t>
+            </a:r>
+            <a:r>
+              <a:rPr lang="en-US" sz="4000" dirty="0" smtClean="0"/>
+              <a:t>. </a:t>
             </a:r>
             <a:endParaRPr lang="en-US" sz="4000" dirty="0"/>
           </a:p>
@@ -3958,7 +3990,11 @@
             <a:pPr algn="l"/>
             <a:r>
               <a:rPr lang="en-US" sz="4000" dirty="0" smtClean="0"/>
-              <a:t>     Judging from the correct classification rate with 7-fold cross validation of 0.8234, the current model is successful especially given the limited computational resources.</a:t>
+              <a:t>     Judging from the correct classification rate with 7-fold cross validation of 0.8234, the current model is </a:t>
+            </a:r>
+            <a:r>
+              <a:rPr lang="en-US" sz="4000" dirty="0" smtClean="0"/>
+              <a:t>successful.</a:t>
             </a:r>
             <a:endParaRPr lang="en-US" sz="4000" dirty="0"/>
           </a:p>
@@ -4056,7 +4092,7 @@
   <p:timing>
     <p:tnLst>
       <p:par>
-        <p:cTn id="1" dur="indefinite" restart="never" nodeType="tmRoot"/>
+        <p:cTn xmlns:p14="http://schemas.microsoft.com/office/powerpoint/2010/main" id="1" dur="indefinite" restart="never" nodeType="tmRoot"/>
       </p:par>
     </p:tnLst>
   </p:timing>
@@ -4106,7 +4142,7 @@
     </a:clrScheme>
     <a:fontScheme name="Office Theme">
       <a:majorFont>
-        <a:latin typeface="Calibri Light" panose="020F0302020204030204"/>
+        <a:latin typeface="Calibri Light"/>
         <a:ea typeface=""/>
         <a:cs typeface=""/>
         <a:font script="Jpan" typeface="ＭＳ Ｐゴシック"/>
@@ -4141,7 +4177,7 @@
         <a:font script="Geor" typeface="Sylfaen"/>
       </a:majorFont>
       <a:minorFont>
-        <a:latin typeface="Calibri" panose="020F0502020204030204"/>
+        <a:latin typeface="Calibri"/>
         <a:ea typeface=""/>
         <a:cs typeface=""/>
         <a:font script="Jpan" typeface="ＭＳ Ｐゴシック"/>
@@ -4318,7 +4354,7 @@
   <a:extraClrSchemeLst/>
   <a:extLst>
     <a:ext uri="{05A4C25C-085E-4340-85A3-A5531E510DB2}">
-      <thm15:themeFamily xmlns:thm15="http://schemas.microsoft.com/office/thememl/2012/main" name="Office Theme" id="{62F939B6-93AF-4DB8-9C6B-D6C7DFDC589F}" vid="{4A3C46E8-61CC-4603-A589-7422A47A8E4A}"/>
+      <thm15:themeFamily xmlns:thm15="http://schemas.microsoft.com/office/thememl/2012/main" xmlns="" name="Office Theme" id="{62F939B6-93AF-4DB8-9C6B-D6C7DFDC589F}" vid="{4A3C46E8-61CC-4603-A589-7422A47A8E4A}"/>
     </a:ext>
   </a:extLst>
 </a:theme>

</xml_diff>